<commit_message>
Vortrag - Desigsn angelegt.
</commit_message>
<xml_diff>
--- a/2-Entwurf/Ressourcen und Protokolle/Präsentation/Vortrag - Entwurf.pptx
+++ b/2-Entwurf/Ressourcen und Protokolle/Präsentation/Vortrag - Entwurf.pptx
@@ -6,19 +6,6 @@
   </p:sldMasterIdLst>
   <p:sldIdLst>
     <p:sldId id="256" r:id="rId2"/>
-    <p:sldId id="257" r:id="rId3"/>
-    <p:sldId id="258" r:id="rId4"/>
-    <p:sldId id="259" r:id="rId5"/>
-    <p:sldId id="260" r:id="rId6"/>
-    <p:sldId id="261" r:id="rId7"/>
-    <p:sldId id="262" r:id="rId8"/>
-    <p:sldId id="263" r:id="rId9"/>
-    <p:sldId id="264" r:id="rId10"/>
-    <p:sldId id="265" r:id="rId11"/>
-    <p:sldId id="266" r:id="rId12"/>
-    <p:sldId id="267" r:id="rId13"/>
-    <p:sldId id="268" r:id="rId14"/>
-    <p:sldId id="269" r:id="rId15"/>
   </p:sldIdLst>
   <p:sldSz cx="12192000" cy="6858000"/>
   <p:notesSz cx="6858000" cy="9144000"/>
@@ -272,7 +259,7 @@
           <a:p>
             <a:fld id="{3522928F-4890-439F-A0A3-184587B4358B}" type="datetimeFigureOut">
               <a:rPr lang="de-DE" smtClean="0"/>
-              <a:t>24.06.2019</a:t>
+              <a:t>26.06.2019</a:t>
             </a:fld>
             <a:endParaRPr lang="de-DE"/>
           </a:p>
@@ -342,13 +329,13 @@
   <p:clrMapOvr>
     <a:masterClrMapping/>
   </p:clrMapOvr>
-  <mc:AlternateContent xmlns:mc="http://schemas.openxmlformats.org/markup-compatibility/2006">
-    <mc:Choice xmlns:p159="http://schemas.microsoft.com/office/powerpoint/2015/09/main" Requires="p159">
+  <mc:AlternateContent xmlns:mc="http://schemas.openxmlformats.org/markup-compatibility/2006" xmlns:p159="http://schemas.microsoft.com/office/powerpoint/2015/09/main">
+    <mc:Choice Requires="p159">
       <p:transition xmlns:p14="http://schemas.microsoft.com/office/powerpoint/2010/main" spd="slow" p14:dur="2000">
         <p159:morph option="byObject"/>
       </p:transition>
     </mc:Choice>
-    <mc:Fallback>
+    <mc:Fallback xmlns="">
       <p:transition spd="slow">
         <p:fade/>
       </p:transition>
@@ -482,7 +469,7 @@
           <a:p>
             <a:fld id="{3522928F-4890-439F-A0A3-184587B4358B}" type="datetimeFigureOut">
               <a:rPr lang="de-DE" smtClean="0"/>
-              <a:t>24.06.2019</a:t>
+              <a:t>26.06.2019</a:t>
             </a:fld>
             <a:endParaRPr lang="de-DE"/>
           </a:p>
@@ -552,13 +539,13 @@
   <p:clrMapOvr>
     <a:masterClrMapping/>
   </p:clrMapOvr>
-  <mc:AlternateContent xmlns:mc="http://schemas.openxmlformats.org/markup-compatibility/2006">
-    <mc:Choice xmlns:p159="http://schemas.microsoft.com/office/powerpoint/2015/09/main" Requires="p159">
+  <mc:AlternateContent xmlns:mc="http://schemas.openxmlformats.org/markup-compatibility/2006" xmlns:p159="http://schemas.microsoft.com/office/powerpoint/2015/09/main">
+    <mc:Choice Requires="p159">
       <p:transition xmlns:p14="http://schemas.microsoft.com/office/powerpoint/2010/main" spd="slow" p14:dur="2000">
         <p159:morph option="byObject"/>
       </p:transition>
     </mc:Choice>
-    <mc:Fallback>
+    <mc:Fallback xmlns="">
       <p:transition spd="slow">
         <p:fade/>
       </p:transition>
@@ -702,7 +689,7 @@
           <a:p>
             <a:fld id="{3522928F-4890-439F-A0A3-184587B4358B}" type="datetimeFigureOut">
               <a:rPr lang="de-DE" smtClean="0"/>
-              <a:t>24.06.2019</a:t>
+              <a:t>26.06.2019</a:t>
             </a:fld>
             <a:endParaRPr lang="de-DE"/>
           </a:p>
@@ -772,13 +759,13 @@
   <p:clrMapOvr>
     <a:masterClrMapping/>
   </p:clrMapOvr>
-  <mc:AlternateContent xmlns:mc="http://schemas.openxmlformats.org/markup-compatibility/2006">
-    <mc:Choice xmlns:p159="http://schemas.microsoft.com/office/powerpoint/2015/09/main" Requires="p159">
+  <mc:AlternateContent xmlns:mc="http://schemas.openxmlformats.org/markup-compatibility/2006" xmlns:p159="http://schemas.microsoft.com/office/powerpoint/2015/09/main">
+    <mc:Choice Requires="p159">
       <p:transition xmlns:p14="http://schemas.microsoft.com/office/powerpoint/2010/main" spd="slow" p14:dur="2000">
         <p159:morph option="byObject"/>
       </p:transition>
     </mc:Choice>
-    <mc:Fallback>
+    <mc:Fallback xmlns="">
       <p:transition spd="slow">
         <p:fade/>
       </p:transition>
@@ -912,7 +899,7 @@
           <a:p>
             <a:fld id="{3522928F-4890-439F-A0A3-184587B4358B}" type="datetimeFigureOut">
               <a:rPr lang="de-DE" smtClean="0"/>
-              <a:t>24.06.2019</a:t>
+              <a:t>26.06.2019</a:t>
             </a:fld>
             <a:endParaRPr lang="de-DE"/>
           </a:p>
@@ -982,13 +969,13 @@
   <p:clrMapOvr>
     <a:masterClrMapping/>
   </p:clrMapOvr>
-  <mc:AlternateContent xmlns:mc="http://schemas.openxmlformats.org/markup-compatibility/2006">
-    <mc:Choice xmlns:p159="http://schemas.microsoft.com/office/powerpoint/2015/09/main" Requires="p159">
+  <mc:AlternateContent xmlns:mc="http://schemas.openxmlformats.org/markup-compatibility/2006" xmlns:p159="http://schemas.microsoft.com/office/powerpoint/2015/09/main">
+    <mc:Choice Requires="p159">
       <p:transition xmlns:p14="http://schemas.microsoft.com/office/powerpoint/2010/main" spd="slow" p14:dur="2000">
         <p159:morph option="byObject"/>
       </p:transition>
     </mc:Choice>
-    <mc:Fallback>
+    <mc:Fallback xmlns="">
       <p:transition spd="slow">
         <p:fade/>
       </p:transition>
@@ -1199,7 +1186,7 @@
           <a:p>
             <a:fld id="{3522928F-4890-439F-A0A3-184587B4358B}" type="datetimeFigureOut">
               <a:rPr lang="de-DE" smtClean="0"/>
-              <a:t>24.06.2019</a:t>
+              <a:t>26.06.2019</a:t>
             </a:fld>
             <a:endParaRPr lang="de-DE"/>
           </a:p>
@@ -1269,13 +1256,13 @@
   <p:clrMapOvr>
     <a:masterClrMapping/>
   </p:clrMapOvr>
-  <mc:AlternateContent xmlns:mc="http://schemas.openxmlformats.org/markup-compatibility/2006">
-    <mc:Choice xmlns:p159="http://schemas.microsoft.com/office/powerpoint/2015/09/main" Requires="p159">
+  <mc:AlternateContent xmlns:mc="http://schemas.openxmlformats.org/markup-compatibility/2006" xmlns:p159="http://schemas.microsoft.com/office/powerpoint/2015/09/main">
+    <mc:Choice Requires="p159">
       <p:transition xmlns:p14="http://schemas.microsoft.com/office/powerpoint/2010/main" spd="slow" p14:dur="2000">
         <p159:morph option="byObject"/>
       </p:transition>
     </mc:Choice>
-    <mc:Fallback>
+    <mc:Fallback xmlns="">
       <p:transition spd="slow">
         <p:fade/>
       </p:transition>
@@ -1476,7 +1463,7 @@
           <a:p>
             <a:fld id="{3522928F-4890-439F-A0A3-184587B4358B}" type="datetimeFigureOut">
               <a:rPr lang="de-DE" smtClean="0"/>
-              <a:t>24.06.2019</a:t>
+              <a:t>26.06.2019</a:t>
             </a:fld>
             <a:endParaRPr lang="de-DE"/>
           </a:p>
@@ -1546,13 +1533,13 @@
   <p:clrMapOvr>
     <a:masterClrMapping/>
   </p:clrMapOvr>
-  <mc:AlternateContent xmlns:mc="http://schemas.openxmlformats.org/markup-compatibility/2006">
-    <mc:Choice xmlns:p159="http://schemas.microsoft.com/office/powerpoint/2015/09/main" Requires="p159">
+  <mc:AlternateContent xmlns:mc="http://schemas.openxmlformats.org/markup-compatibility/2006" xmlns:p159="http://schemas.microsoft.com/office/powerpoint/2015/09/main">
+    <mc:Choice Requires="p159">
       <p:transition xmlns:p14="http://schemas.microsoft.com/office/powerpoint/2010/main" spd="slow" p14:dur="2000">
         <p159:morph option="byObject"/>
       </p:transition>
     </mc:Choice>
-    <mc:Fallback>
+    <mc:Fallback xmlns="">
       <p:transition spd="slow">
         <p:fade/>
       </p:transition>
@@ -1900,7 +1887,7 @@
           <a:p>
             <a:fld id="{3522928F-4890-439F-A0A3-184587B4358B}" type="datetimeFigureOut">
               <a:rPr lang="de-DE" smtClean="0"/>
-              <a:t>24.06.2019</a:t>
+              <a:t>26.06.2019</a:t>
             </a:fld>
             <a:endParaRPr lang="de-DE"/>
           </a:p>
@@ -1970,13 +1957,13 @@
   <p:clrMapOvr>
     <a:masterClrMapping/>
   </p:clrMapOvr>
-  <mc:AlternateContent xmlns:mc="http://schemas.openxmlformats.org/markup-compatibility/2006">
-    <mc:Choice xmlns:p159="http://schemas.microsoft.com/office/powerpoint/2015/09/main" Requires="p159">
+  <mc:AlternateContent xmlns:mc="http://schemas.openxmlformats.org/markup-compatibility/2006" xmlns:p159="http://schemas.microsoft.com/office/powerpoint/2015/09/main">
+    <mc:Choice Requires="p159">
       <p:transition xmlns:p14="http://schemas.microsoft.com/office/powerpoint/2010/main" spd="slow" p14:dur="2000">
         <p159:morph option="byObject"/>
       </p:transition>
     </mc:Choice>
-    <mc:Fallback>
+    <mc:Fallback xmlns="">
       <p:transition spd="slow">
         <p:fade/>
       </p:transition>
@@ -2053,7 +2040,7 @@
           <a:p>
             <a:fld id="{3522928F-4890-439F-A0A3-184587B4358B}" type="datetimeFigureOut">
               <a:rPr lang="de-DE" smtClean="0"/>
-              <a:t>24.06.2019</a:t>
+              <a:t>26.06.2019</a:t>
             </a:fld>
             <a:endParaRPr lang="de-DE"/>
           </a:p>
@@ -2123,13 +2110,13 @@
   <p:clrMapOvr>
     <a:masterClrMapping/>
   </p:clrMapOvr>
-  <mc:AlternateContent xmlns:mc="http://schemas.openxmlformats.org/markup-compatibility/2006">
-    <mc:Choice xmlns:p159="http://schemas.microsoft.com/office/powerpoint/2015/09/main" Requires="p159">
+  <mc:AlternateContent xmlns:mc="http://schemas.openxmlformats.org/markup-compatibility/2006" xmlns:p159="http://schemas.microsoft.com/office/powerpoint/2015/09/main">
+    <mc:Choice Requires="p159">
       <p:transition xmlns:p14="http://schemas.microsoft.com/office/powerpoint/2010/main" spd="slow" p14:dur="2000">
         <p159:morph option="byObject"/>
       </p:transition>
     </mc:Choice>
-    <mc:Fallback>
+    <mc:Fallback xmlns="">
       <p:transition spd="slow">
         <p:fade/>
       </p:transition>
@@ -2178,7 +2165,7 @@
           <a:p>
             <a:fld id="{3522928F-4890-439F-A0A3-184587B4358B}" type="datetimeFigureOut">
               <a:rPr lang="de-DE" smtClean="0"/>
-              <a:t>24.06.2019</a:t>
+              <a:t>26.06.2019</a:t>
             </a:fld>
             <a:endParaRPr lang="de-DE"/>
           </a:p>
@@ -2248,13 +2235,13 @@
   <p:clrMapOvr>
     <a:masterClrMapping/>
   </p:clrMapOvr>
-  <mc:AlternateContent xmlns:mc="http://schemas.openxmlformats.org/markup-compatibility/2006">
-    <mc:Choice xmlns:p159="http://schemas.microsoft.com/office/powerpoint/2015/09/main" Requires="p159">
+  <mc:AlternateContent xmlns:mc="http://schemas.openxmlformats.org/markup-compatibility/2006" xmlns:p159="http://schemas.microsoft.com/office/powerpoint/2015/09/main">
+    <mc:Choice Requires="p159">
       <p:transition xmlns:p14="http://schemas.microsoft.com/office/powerpoint/2010/main" spd="slow" p14:dur="2000">
         <p159:morph option="byObject"/>
       </p:transition>
     </mc:Choice>
-    <mc:Fallback>
+    <mc:Fallback xmlns="">
       <p:transition spd="slow">
         <p:fade/>
       </p:transition>
@@ -2501,7 +2488,7 @@
           <a:p>
             <a:fld id="{3522928F-4890-439F-A0A3-184587B4358B}" type="datetimeFigureOut">
               <a:rPr lang="de-DE" smtClean="0"/>
-              <a:t>24.06.2019</a:t>
+              <a:t>26.06.2019</a:t>
             </a:fld>
             <a:endParaRPr lang="de-DE"/>
           </a:p>
@@ -2571,13 +2558,13 @@
   <p:clrMapOvr>
     <a:masterClrMapping/>
   </p:clrMapOvr>
-  <mc:AlternateContent xmlns:mc="http://schemas.openxmlformats.org/markup-compatibility/2006">
-    <mc:Choice xmlns:p159="http://schemas.microsoft.com/office/powerpoint/2015/09/main" Requires="p159">
+  <mc:AlternateContent xmlns:mc="http://schemas.openxmlformats.org/markup-compatibility/2006" xmlns:p159="http://schemas.microsoft.com/office/powerpoint/2015/09/main">
+    <mc:Choice Requires="p159">
       <p:transition xmlns:p14="http://schemas.microsoft.com/office/powerpoint/2010/main" spd="slow" p14:dur="2000">
         <p159:morph option="byObject"/>
       </p:transition>
     </mc:Choice>
-    <mc:Fallback>
+    <mc:Fallback xmlns="">
       <p:transition spd="slow">
         <p:fade/>
       </p:transition>
@@ -2801,7 +2788,7 @@
           <a:p>
             <a:fld id="{3522928F-4890-439F-A0A3-184587B4358B}" type="datetimeFigureOut">
               <a:rPr lang="de-DE" smtClean="0"/>
-              <a:t>24.06.2019</a:t>
+              <a:t>26.06.2019</a:t>
             </a:fld>
             <a:endParaRPr lang="de-DE"/>
           </a:p>
@@ -2871,13 +2858,13 @@
   <p:clrMapOvr>
     <a:masterClrMapping/>
   </p:clrMapOvr>
-  <mc:AlternateContent xmlns:mc="http://schemas.openxmlformats.org/markup-compatibility/2006">
-    <mc:Choice xmlns:p159="http://schemas.microsoft.com/office/powerpoint/2015/09/main" Requires="p159">
+  <mc:AlternateContent xmlns:mc="http://schemas.openxmlformats.org/markup-compatibility/2006" xmlns:p159="http://schemas.microsoft.com/office/powerpoint/2015/09/main">
+    <mc:Choice Requires="p159">
       <p:transition xmlns:p14="http://schemas.microsoft.com/office/powerpoint/2010/main" spd="slow" p14:dur="2000">
         <p159:morph option="byObject"/>
       </p:transition>
     </mc:Choice>
-    <mc:Fallback>
+    <mc:Fallback xmlns="">
       <p:transition spd="slow">
         <p:fade/>
       </p:transition>
@@ -3054,7 +3041,7 @@
           <a:p>
             <a:fld id="{3522928F-4890-439F-A0A3-184587B4358B}" type="datetimeFigureOut">
               <a:rPr lang="de-DE" smtClean="0"/>
-              <a:t>24.06.2019</a:t>
+              <a:t>26.06.2019</a:t>
             </a:fld>
             <a:endParaRPr lang="de-DE"/>
           </a:p>
@@ -3171,13 +3158,13 @@
     <p:sldLayoutId id="2147483658" r:id="rId10"/>
     <p:sldLayoutId id="2147483659" r:id="rId11"/>
   </p:sldLayoutIdLst>
-  <mc:AlternateContent xmlns:mc="http://schemas.openxmlformats.org/markup-compatibility/2006">
-    <mc:Choice xmlns:p159="http://schemas.microsoft.com/office/powerpoint/2015/09/main" Requires="p159">
+  <mc:AlternateContent xmlns:mc="http://schemas.openxmlformats.org/markup-compatibility/2006" xmlns:p159="http://schemas.microsoft.com/office/powerpoint/2015/09/main">
+    <mc:Choice Requires="p159">
       <p:transition xmlns:p14="http://schemas.microsoft.com/office/powerpoint/2010/main" spd="slow" p14:dur="2000">
         <p159:morph option="byObject"/>
       </p:transition>
     </mc:Choice>
-    <mc:Fallback>
+    <mc:Fallback xmlns="">
       <p:transition spd="slow">
         <p:fade/>
       </p:transition>
@@ -3485,10 +3472,10 @@
       </p:grpSpPr>
       <p:pic>
         <p:nvPicPr>
-          <p:cNvPr id="3" name="Grafik 2" descr="Ein Bild, das Screenshot, Karte enthält.&#10;&#10;Mit sehr hoher Zuverlässigkeit generierte Beschreibung">
-            <a:extLst>
-              <a:ext uri="{FF2B5EF4-FFF2-40B4-BE49-F238E27FC236}">
-                <a16:creationId xmlns:a16="http://schemas.microsoft.com/office/drawing/2014/main" id="{320620FF-266D-439D-828E-695F59B5BBED}"/>
+          <p:cNvPr id="4" name="Grafik 3" descr="Ein Bild, das Text, Karte enthält.&#10;&#10;Mit sehr hoher Zuverlässigkeit generierte Beschreibung">
+            <a:extLst>
+              <a:ext uri="{FF2B5EF4-FFF2-40B4-BE49-F238E27FC236}">
+                <a16:creationId xmlns:a16="http://schemas.microsoft.com/office/drawing/2014/main" id="{B6BDED02-6AAF-4084-82A3-2D1F1C5E9304}"/>
               </a:ext>
             </a:extLst>
           </p:cNvPr>
@@ -3499,16 +3486,6 @@
         </p:nvPicPr>
         <p:blipFill>
           <a:blip r:embed="rId2">
-            <a:clrChange>
-              <a:clrFrom>
-                <a:srgbClr val="FFFFFF"/>
-              </a:clrFrom>
-              <a:clrTo>
-                <a:srgbClr val="FFFFFF">
-                  <a:alpha val="0"/>
-                </a:srgbClr>
-              </a:clrTo>
-            </a:clrChange>
             <a:extLst>
               <a:ext uri="{28A0092B-C50C-407E-A947-70E740481C1C}">
                 <a14:useLocalDpi xmlns:a14="http://schemas.microsoft.com/office/drawing/2010/main" val="0"/>
@@ -3521,8 +3498,8 @@
         </p:blipFill>
         <p:spPr>
           <a:xfrm>
-            <a:off x="567187" y="-2100944"/>
-            <a:ext cx="25964804" cy="12696373"/>
+            <a:off x="2961434" y="829242"/>
+            <a:ext cx="5846696" cy="5199515"/>
           </a:xfrm>
           <a:prstGeom prst="rect">
             <a:avLst/>
@@ -3539,1157 +3516,13 @@
   <p:clrMapOvr>
     <a:masterClrMapping/>
   </p:clrMapOvr>
-  <mc:AlternateContent xmlns:mc="http://schemas.openxmlformats.org/markup-compatibility/2006">
-    <mc:Choice xmlns:p159="http://schemas.microsoft.com/office/powerpoint/2015/09/main" Requires="p159">
+  <mc:AlternateContent xmlns:mc="http://schemas.openxmlformats.org/markup-compatibility/2006" xmlns:p159="http://schemas.microsoft.com/office/powerpoint/2015/09/main">
+    <mc:Choice Requires="p159">
       <p:transition xmlns:p14="http://schemas.microsoft.com/office/powerpoint/2010/main" spd="slow" p14:dur="2000">
         <p159:morph option="byObject"/>
       </p:transition>
     </mc:Choice>
-    <mc:Fallback>
-      <p:transition spd="slow">
-        <p:fade/>
-      </p:transition>
-    </mc:Fallback>
-  </mc:AlternateContent>
-</p:sld>
-</file>
-
-<file path=ppt/slides/slide10.xml><?xml version="1.0" encoding="utf-8"?>
-<p:sld xmlns:a="http://schemas.openxmlformats.org/drawingml/2006/main" xmlns:r="http://schemas.openxmlformats.org/officeDocument/2006/relationships" xmlns:p="http://schemas.openxmlformats.org/presentationml/2006/main">
-  <p:cSld>
-    <p:spTree>
-      <p:nvGrpSpPr>
-        <p:cNvPr id="1" name=""/>
-        <p:cNvGrpSpPr/>
-        <p:nvPr/>
-      </p:nvGrpSpPr>
-      <p:grpSpPr>
-        <a:xfrm>
-          <a:off x="0" y="0"/>
-          <a:ext cx="0" cy="0"/>
-          <a:chOff x="0" y="0"/>
-          <a:chExt cx="0" cy="0"/>
-        </a:xfrm>
-      </p:grpSpPr>
-      <p:pic>
-        <p:nvPicPr>
-          <p:cNvPr id="3" name="Grafik 2" descr="Ein Bild, das Screenshot, Karte enthält.&#10;&#10;Mit sehr hoher Zuverlässigkeit generierte Beschreibung">
-            <a:extLst>
-              <a:ext uri="{FF2B5EF4-FFF2-40B4-BE49-F238E27FC236}">
-                <a16:creationId xmlns:a16="http://schemas.microsoft.com/office/drawing/2014/main" id="{320620FF-266D-439D-828E-695F59B5BBED}"/>
-              </a:ext>
-            </a:extLst>
-          </p:cNvPr>
-          <p:cNvPicPr>
-            <a:picLocks noChangeAspect="1"/>
-          </p:cNvPicPr>
-          <p:nvPr/>
-        </p:nvPicPr>
-        <p:blipFill>
-          <a:blip r:embed="rId2">
-            <a:clrChange>
-              <a:clrFrom>
-                <a:srgbClr val="FFFFFF"/>
-              </a:clrFrom>
-              <a:clrTo>
-                <a:srgbClr val="FFFFFF">
-                  <a:alpha val="0"/>
-                </a:srgbClr>
-              </a:clrTo>
-            </a:clrChange>
-            <a:extLst>
-              <a:ext uri="{28A0092B-C50C-407E-A947-70E740481C1C}">
-                <a14:useLocalDpi xmlns:a14="http://schemas.microsoft.com/office/drawing/2010/main" val="0"/>
-              </a:ext>
-            </a:extLst>
-          </a:blip>
-          <a:stretch>
-            <a:fillRect/>
-          </a:stretch>
-        </p:blipFill>
-        <p:spPr>
-          <a:xfrm>
-            <a:off x="-19099671" y="-2267858"/>
-            <a:ext cx="39388732" cy="19260458"/>
-          </a:xfrm>
-          <a:prstGeom prst="rect">
-            <a:avLst/>
-          </a:prstGeom>
-        </p:spPr>
-      </p:pic>
-    </p:spTree>
-    <p:extLst>
-      <p:ext uri="{BB962C8B-B14F-4D97-AF65-F5344CB8AC3E}">
-        <p14:creationId xmlns:p14="http://schemas.microsoft.com/office/powerpoint/2010/main" val="1216403457"/>
-      </p:ext>
-    </p:extLst>
-  </p:cSld>
-  <p:clrMapOvr>
-    <a:masterClrMapping/>
-  </p:clrMapOvr>
-  <mc:AlternateContent xmlns:mc="http://schemas.openxmlformats.org/markup-compatibility/2006">
-    <mc:Choice xmlns:p159="http://schemas.microsoft.com/office/powerpoint/2015/09/main" Requires="p159">
-      <p:transition xmlns:p14="http://schemas.microsoft.com/office/powerpoint/2010/main" spd="slow" p14:dur="2000">
-        <p159:morph option="byObject"/>
-      </p:transition>
-    </mc:Choice>
-    <mc:Fallback>
-      <p:transition spd="slow">
-        <p:fade/>
-      </p:transition>
-    </mc:Fallback>
-  </mc:AlternateContent>
-</p:sld>
-</file>
-
-<file path=ppt/slides/slide11.xml><?xml version="1.0" encoding="utf-8"?>
-<p:sld xmlns:a="http://schemas.openxmlformats.org/drawingml/2006/main" xmlns:r="http://schemas.openxmlformats.org/officeDocument/2006/relationships" xmlns:p="http://schemas.openxmlformats.org/presentationml/2006/main">
-  <p:cSld>
-    <p:spTree>
-      <p:nvGrpSpPr>
-        <p:cNvPr id="1" name=""/>
-        <p:cNvGrpSpPr/>
-        <p:nvPr/>
-      </p:nvGrpSpPr>
-      <p:grpSpPr>
-        <a:xfrm>
-          <a:off x="0" y="0"/>
-          <a:ext cx="0" cy="0"/>
-          <a:chOff x="0" y="0"/>
-          <a:chExt cx="0" cy="0"/>
-        </a:xfrm>
-      </p:grpSpPr>
-      <p:pic>
-        <p:nvPicPr>
-          <p:cNvPr id="3" name="Grafik 2" descr="Ein Bild, das Screenshot, Karte enthält.&#10;&#10;Mit sehr hoher Zuverlässigkeit generierte Beschreibung">
-            <a:extLst>
-              <a:ext uri="{FF2B5EF4-FFF2-40B4-BE49-F238E27FC236}">
-                <a16:creationId xmlns:a16="http://schemas.microsoft.com/office/drawing/2014/main" id="{320620FF-266D-439D-828E-695F59B5BBED}"/>
-              </a:ext>
-            </a:extLst>
-          </p:cNvPr>
-          <p:cNvPicPr>
-            <a:picLocks noChangeAspect="1"/>
-          </p:cNvPicPr>
-          <p:nvPr/>
-        </p:nvPicPr>
-        <p:blipFill>
-          <a:blip r:embed="rId2">
-            <a:clrChange>
-              <a:clrFrom>
-                <a:srgbClr val="FFFFFF"/>
-              </a:clrFrom>
-              <a:clrTo>
-                <a:srgbClr val="FFFFFF">
-                  <a:alpha val="0"/>
-                </a:srgbClr>
-              </a:clrTo>
-            </a:clrChange>
-            <a:extLst>
-              <a:ext uri="{28A0092B-C50C-407E-A947-70E740481C1C}">
-                <a14:useLocalDpi xmlns:a14="http://schemas.microsoft.com/office/drawing/2010/main" val="0"/>
-              </a:ext>
-            </a:extLst>
-          </a:blip>
-          <a:stretch>
-            <a:fillRect/>
-          </a:stretch>
-        </p:blipFill>
-        <p:spPr>
-          <a:xfrm>
-            <a:off x="-27214971" y="-1124858"/>
-            <a:ext cx="40092771" cy="19604722"/>
-          </a:xfrm>
-          <a:prstGeom prst="rect">
-            <a:avLst/>
-          </a:prstGeom>
-        </p:spPr>
-      </p:pic>
-    </p:spTree>
-    <p:extLst>
-      <p:ext uri="{BB962C8B-B14F-4D97-AF65-F5344CB8AC3E}">
-        <p14:creationId xmlns:p14="http://schemas.microsoft.com/office/powerpoint/2010/main" val="4022555802"/>
-      </p:ext>
-    </p:extLst>
-  </p:cSld>
-  <p:clrMapOvr>
-    <a:masterClrMapping/>
-  </p:clrMapOvr>
-  <mc:AlternateContent xmlns:mc="http://schemas.openxmlformats.org/markup-compatibility/2006">
-    <mc:Choice xmlns:p159="http://schemas.microsoft.com/office/powerpoint/2015/09/main" Requires="p159">
-      <p:transition xmlns:p14="http://schemas.microsoft.com/office/powerpoint/2010/main" spd="slow" p14:dur="2000">
-        <p159:morph option="byObject"/>
-      </p:transition>
-    </mc:Choice>
-    <mc:Fallback>
-      <p:transition spd="slow">
-        <p:fade/>
-      </p:transition>
-    </mc:Fallback>
-  </mc:AlternateContent>
-</p:sld>
-</file>
-
-<file path=ppt/slides/slide12.xml><?xml version="1.0" encoding="utf-8"?>
-<p:sld xmlns:a="http://schemas.openxmlformats.org/drawingml/2006/main" xmlns:r="http://schemas.openxmlformats.org/officeDocument/2006/relationships" xmlns:p="http://schemas.openxmlformats.org/presentationml/2006/main">
-  <p:cSld>
-    <p:spTree>
-      <p:nvGrpSpPr>
-        <p:cNvPr id="1" name=""/>
-        <p:cNvGrpSpPr/>
-        <p:nvPr/>
-      </p:nvGrpSpPr>
-      <p:grpSpPr>
-        <a:xfrm>
-          <a:off x="0" y="0"/>
-          <a:ext cx="0" cy="0"/>
-          <a:chOff x="0" y="0"/>
-          <a:chExt cx="0" cy="0"/>
-        </a:xfrm>
-      </p:grpSpPr>
-      <p:pic>
-        <p:nvPicPr>
-          <p:cNvPr id="3" name="Grafik 2" descr="Ein Bild, das Screenshot, Karte enthält.&#10;&#10;Mit sehr hoher Zuverlässigkeit generierte Beschreibung">
-            <a:extLst>
-              <a:ext uri="{FF2B5EF4-FFF2-40B4-BE49-F238E27FC236}">
-                <a16:creationId xmlns:a16="http://schemas.microsoft.com/office/drawing/2014/main" id="{320620FF-266D-439D-828E-695F59B5BBED}"/>
-              </a:ext>
-            </a:extLst>
-          </p:cNvPr>
-          <p:cNvPicPr>
-            <a:picLocks noChangeAspect="1"/>
-          </p:cNvPicPr>
-          <p:nvPr/>
-        </p:nvPicPr>
-        <p:blipFill>
-          <a:blip r:embed="rId2">
-            <a:clrChange>
-              <a:clrFrom>
-                <a:srgbClr val="FFFFFF"/>
-              </a:clrFrom>
-              <a:clrTo>
-                <a:srgbClr val="FFFFFF">
-                  <a:alpha val="0"/>
-                </a:srgbClr>
-              </a:clrTo>
-            </a:clrChange>
-            <a:extLst>
-              <a:ext uri="{28A0092B-C50C-407E-A947-70E740481C1C}">
-                <a14:useLocalDpi xmlns:a14="http://schemas.microsoft.com/office/drawing/2010/main" val="0"/>
-              </a:ext>
-            </a:extLst>
-          </a:blip>
-          <a:stretch>
-            <a:fillRect/>
-          </a:stretch>
-        </p:blipFill>
-        <p:spPr>
-          <a:xfrm>
-            <a:off x="-36930471" y="-8821058"/>
-            <a:ext cx="52741971" cy="25789978"/>
-          </a:xfrm>
-          <a:prstGeom prst="rect">
-            <a:avLst/>
-          </a:prstGeom>
-        </p:spPr>
-      </p:pic>
-    </p:spTree>
-    <p:extLst>
-      <p:ext uri="{BB962C8B-B14F-4D97-AF65-F5344CB8AC3E}">
-        <p14:creationId xmlns:p14="http://schemas.microsoft.com/office/powerpoint/2010/main" val="2578894890"/>
-      </p:ext>
-    </p:extLst>
-  </p:cSld>
-  <p:clrMapOvr>
-    <a:masterClrMapping/>
-  </p:clrMapOvr>
-  <mc:AlternateContent xmlns:mc="http://schemas.openxmlformats.org/markup-compatibility/2006">
-    <mc:Choice xmlns:p159="http://schemas.microsoft.com/office/powerpoint/2015/09/main" Requires="p159">
-      <p:transition xmlns:p14="http://schemas.microsoft.com/office/powerpoint/2010/main" spd="slow" p14:dur="2000">
-        <p159:morph option="byObject"/>
-      </p:transition>
-    </mc:Choice>
-    <mc:Fallback>
-      <p:transition spd="slow">
-        <p:fade/>
-      </p:transition>
-    </mc:Fallback>
-  </mc:AlternateContent>
-</p:sld>
-</file>
-
-<file path=ppt/slides/slide13.xml><?xml version="1.0" encoding="utf-8"?>
-<p:sld xmlns:a="http://schemas.openxmlformats.org/drawingml/2006/main" xmlns:r="http://schemas.openxmlformats.org/officeDocument/2006/relationships" xmlns:p="http://schemas.openxmlformats.org/presentationml/2006/main">
-  <p:cSld>
-    <p:spTree>
-      <p:nvGrpSpPr>
-        <p:cNvPr id="1" name=""/>
-        <p:cNvGrpSpPr/>
-        <p:nvPr/>
-      </p:nvGrpSpPr>
-      <p:grpSpPr>
-        <a:xfrm>
-          <a:off x="0" y="0"/>
-          <a:ext cx="0" cy="0"/>
-          <a:chOff x="0" y="0"/>
-          <a:chExt cx="0" cy="0"/>
-        </a:xfrm>
-      </p:grpSpPr>
-      <p:pic>
-        <p:nvPicPr>
-          <p:cNvPr id="4" name="Grafik 3" descr="Ein Bild, das Screenshot, Karte enthält.&#10;&#10;Mit sehr hoher Zuverlässigkeit generierte Beschreibung">
-            <a:extLst>
-              <a:ext uri="{FF2B5EF4-FFF2-40B4-BE49-F238E27FC236}">
-                <a16:creationId xmlns:a16="http://schemas.microsoft.com/office/drawing/2014/main" id="{0FC81955-66C3-4594-81DC-BEF501455688}"/>
-              </a:ext>
-            </a:extLst>
-          </p:cNvPr>
-          <p:cNvPicPr>
-            <a:picLocks noChangeAspect="1"/>
-          </p:cNvPicPr>
-          <p:nvPr/>
-        </p:nvPicPr>
-        <p:blipFill>
-          <a:blip r:embed="rId2">
-            <a:clrChange>
-              <a:clrFrom>
-                <a:srgbClr val="FFFFFF"/>
-              </a:clrFrom>
-              <a:clrTo>
-                <a:srgbClr val="FFFFFF">
-                  <a:alpha val="0"/>
-                </a:srgbClr>
-              </a:clrTo>
-            </a:clrChange>
-            <a:extLst>
-              <a:ext uri="{28A0092B-C50C-407E-A947-70E740481C1C}">
-                <a14:useLocalDpi xmlns:a14="http://schemas.microsoft.com/office/drawing/2010/main" val="0"/>
-              </a:ext>
-            </a:extLst>
-          </a:blip>
-          <a:stretch>
-            <a:fillRect/>
-          </a:stretch>
-        </p:blipFill>
-        <p:spPr>
-          <a:xfrm>
-            <a:off x="-32739471" y="0"/>
-            <a:ext cx="41692838" cy="20387129"/>
-          </a:xfrm>
-          <a:prstGeom prst="rect">
-            <a:avLst/>
-          </a:prstGeom>
-        </p:spPr>
-      </p:pic>
-    </p:spTree>
-    <p:extLst>
-      <p:ext uri="{BB962C8B-B14F-4D97-AF65-F5344CB8AC3E}">
-        <p14:creationId xmlns:p14="http://schemas.microsoft.com/office/powerpoint/2010/main" val="2103549043"/>
-      </p:ext>
-    </p:extLst>
-  </p:cSld>
-  <p:clrMapOvr>
-    <a:masterClrMapping/>
-  </p:clrMapOvr>
-  <mc:AlternateContent xmlns:mc="http://schemas.openxmlformats.org/markup-compatibility/2006">
-    <mc:Choice xmlns:p159="http://schemas.microsoft.com/office/powerpoint/2015/09/main" Requires="p159">
-      <p:transition xmlns:p14="http://schemas.microsoft.com/office/powerpoint/2010/main" spd="slow" p14:dur="2000">
-        <p159:morph option="byObject"/>
-      </p:transition>
-    </mc:Choice>
-    <mc:Fallback>
-      <p:transition spd="slow">
-        <p:fade/>
-      </p:transition>
-    </mc:Fallback>
-  </mc:AlternateContent>
-</p:sld>
-</file>
-
-<file path=ppt/slides/slide14.xml><?xml version="1.0" encoding="utf-8"?>
-<p:sld xmlns:a="http://schemas.openxmlformats.org/drawingml/2006/main" xmlns:r="http://schemas.openxmlformats.org/officeDocument/2006/relationships" xmlns:p="http://schemas.openxmlformats.org/presentationml/2006/main">
-  <p:cSld>
-    <p:spTree>
-      <p:nvGrpSpPr>
-        <p:cNvPr id="1" name=""/>
-        <p:cNvGrpSpPr/>
-        <p:nvPr/>
-      </p:nvGrpSpPr>
-      <p:grpSpPr>
-        <a:xfrm>
-          <a:off x="0" y="0"/>
-          <a:ext cx="0" cy="0"/>
-          <a:chOff x="0" y="0"/>
-          <a:chExt cx="0" cy="0"/>
-        </a:xfrm>
-      </p:grpSpPr>
-      <p:pic>
-        <p:nvPicPr>
-          <p:cNvPr id="3" name="Grafik 2" descr="Ein Bild, das Screenshot, Karte enthält.&#10;&#10;Mit sehr hoher Zuverlässigkeit generierte Beschreibung">
-            <a:extLst>
-              <a:ext uri="{FF2B5EF4-FFF2-40B4-BE49-F238E27FC236}">
-                <a16:creationId xmlns:a16="http://schemas.microsoft.com/office/drawing/2014/main" id="{320620FF-266D-439D-828E-695F59B5BBED}"/>
-              </a:ext>
-            </a:extLst>
-          </p:cNvPr>
-          <p:cNvPicPr>
-            <a:picLocks noChangeAspect="1"/>
-          </p:cNvPicPr>
-          <p:nvPr/>
-        </p:nvPicPr>
-        <p:blipFill>
-          <a:blip r:embed="rId2">
-            <a:clrChange>
-              <a:clrFrom>
-                <a:srgbClr val="FFFFFF"/>
-              </a:clrFrom>
-              <a:clrTo>
-                <a:srgbClr val="FFFFFF">
-                  <a:alpha val="0"/>
-                </a:srgbClr>
-              </a:clrTo>
-            </a:clrChange>
-            <a:extLst>
-              <a:ext uri="{28A0092B-C50C-407E-A947-70E740481C1C}">
-                <a14:useLocalDpi xmlns:a14="http://schemas.microsoft.com/office/drawing/2010/main" val="0"/>
-              </a:ext>
-            </a:extLst>
-          </a:blip>
-          <a:stretch>
-            <a:fillRect/>
-          </a:stretch>
-        </p:blipFill>
-        <p:spPr>
-          <a:xfrm>
-            <a:off x="712329" y="627742"/>
-            <a:ext cx="10767341" cy="5265057"/>
-          </a:xfrm>
-          <a:prstGeom prst="rect">
-            <a:avLst/>
-          </a:prstGeom>
-        </p:spPr>
-      </p:pic>
-    </p:spTree>
-    <p:extLst>
-      <p:ext uri="{BB962C8B-B14F-4D97-AF65-F5344CB8AC3E}">
-        <p14:creationId xmlns:p14="http://schemas.microsoft.com/office/powerpoint/2010/main" val="3033142157"/>
-      </p:ext>
-    </p:extLst>
-  </p:cSld>
-  <p:clrMapOvr>
-    <a:masterClrMapping/>
-  </p:clrMapOvr>
-  <mc:AlternateContent xmlns:mc="http://schemas.openxmlformats.org/markup-compatibility/2006">
-    <mc:Choice xmlns:p159="http://schemas.microsoft.com/office/powerpoint/2015/09/main" Requires="p159">
-      <p:transition xmlns:p14="http://schemas.microsoft.com/office/powerpoint/2010/main" spd="slow" p14:dur="2000">
-        <p159:morph option="byObject"/>
-      </p:transition>
-    </mc:Choice>
-    <mc:Fallback>
-      <p:transition spd="slow">
-        <p:fade/>
-      </p:transition>
-    </mc:Fallback>
-  </mc:AlternateContent>
-</p:sld>
-</file>
-
-<file path=ppt/slides/slide2.xml><?xml version="1.0" encoding="utf-8"?>
-<p:sld xmlns:a="http://schemas.openxmlformats.org/drawingml/2006/main" xmlns:r="http://schemas.openxmlformats.org/officeDocument/2006/relationships" xmlns:p="http://schemas.openxmlformats.org/presentationml/2006/main">
-  <p:cSld>
-    <p:spTree>
-      <p:nvGrpSpPr>
-        <p:cNvPr id="1" name=""/>
-        <p:cNvGrpSpPr/>
-        <p:nvPr/>
-      </p:nvGrpSpPr>
-      <p:grpSpPr>
-        <a:xfrm>
-          <a:off x="0" y="0"/>
-          <a:ext cx="0" cy="0"/>
-          <a:chOff x="0" y="0"/>
-          <a:chExt cx="0" cy="0"/>
-        </a:xfrm>
-      </p:grpSpPr>
-      <p:pic>
-        <p:nvPicPr>
-          <p:cNvPr id="3" name="Grafik 2" descr="Ein Bild, das Screenshot, Karte enthält.&#10;&#10;Mit sehr hoher Zuverlässigkeit generierte Beschreibung">
-            <a:extLst>
-              <a:ext uri="{FF2B5EF4-FFF2-40B4-BE49-F238E27FC236}">
-                <a16:creationId xmlns:a16="http://schemas.microsoft.com/office/drawing/2014/main" id="{320620FF-266D-439D-828E-695F59B5BBED}"/>
-              </a:ext>
-            </a:extLst>
-          </p:cNvPr>
-          <p:cNvPicPr>
-            <a:picLocks noChangeAspect="1"/>
-          </p:cNvPicPr>
-          <p:nvPr/>
-        </p:nvPicPr>
-        <p:blipFill>
-          <a:blip r:embed="rId2">
-            <a:clrChange>
-              <a:clrFrom>
-                <a:srgbClr val="FFFFFF"/>
-              </a:clrFrom>
-              <a:clrTo>
-                <a:srgbClr val="FFFFFF">
-                  <a:alpha val="0"/>
-                </a:srgbClr>
-              </a:clrTo>
-            </a:clrChange>
-            <a:extLst>
-              <a:ext uri="{28A0092B-C50C-407E-A947-70E740481C1C}">
-                <a14:useLocalDpi xmlns:a14="http://schemas.microsoft.com/office/drawing/2010/main" val="0"/>
-              </a:ext>
-            </a:extLst>
-          </a:blip>
-          <a:stretch>
-            <a:fillRect/>
-          </a:stretch>
-        </p:blipFill>
-        <p:spPr>
-          <a:xfrm>
-            <a:off x="-1840372" y="-8554359"/>
-            <a:ext cx="36816171" cy="18002517"/>
-          </a:xfrm>
-          <a:prstGeom prst="rect">
-            <a:avLst/>
-          </a:prstGeom>
-        </p:spPr>
-      </p:pic>
-    </p:spTree>
-    <p:extLst>
-      <p:ext uri="{BB962C8B-B14F-4D97-AF65-F5344CB8AC3E}">
-        <p14:creationId xmlns:p14="http://schemas.microsoft.com/office/powerpoint/2010/main" val="4127957704"/>
-      </p:ext>
-    </p:extLst>
-  </p:cSld>
-  <p:clrMapOvr>
-    <a:masterClrMapping/>
-  </p:clrMapOvr>
-  <mc:AlternateContent xmlns:mc="http://schemas.openxmlformats.org/markup-compatibility/2006">
-    <mc:Choice xmlns:p159="http://schemas.microsoft.com/office/powerpoint/2015/09/main" Requires="p159">
-      <p:transition xmlns:p14="http://schemas.microsoft.com/office/powerpoint/2010/main" spd="slow" p14:dur="2000">
-        <p159:morph option="byObject"/>
-      </p:transition>
-    </mc:Choice>
-    <mc:Fallback>
-      <p:transition spd="slow">
-        <p:fade/>
-      </p:transition>
-    </mc:Fallback>
-  </mc:AlternateContent>
-</p:sld>
-</file>
-
-<file path=ppt/slides/slide3.xml><?xml version="1.0" encoding="utf-8"?>
-<p:sld xmlns:a="http://schemas.openxmlformats.org/drawingml/2006/main" xmlns:r="http://schemas.openxmlformats.org/officeDocument/2006/relationships" xmlns:p="http://schemas.openxmlformats.org/presentationml/2006/main">
-  <p:cSld>
-    <p:spTree>
-      <p:nvGrpSpPr>
-        <p:cNvPr id="1" name=""/>
-        <p:cNvGrpSpPr/>
-        <p:nvPr/>
-      </p:nvGrpSpPr>
-      <p:grpSpPr>
-        <a:xfrm>
-          <a:off x="0" y="0"/>
-          <a:ext cx="0" cy="0"/>
-          <a:chOff x="0" y="0"/>
-          <a:chExt cx="0" cy="0"/>
-        </a:xfrm>
-      </p:grpSpPr>
-      <p:pic>
-        <p:nvPicPr>
-          <p:cNvPr id="3" name="Grafik 2" descr="Ein Bild, das Screenshot, Karte enthält.&#10;&#10;Mit sehr hoher Zuverlässigkeit generierte Beschreibung">
-            <a:extLst>
-              <a:ext uri="{FF2B5EF4-FFF2-40B4-BE49-F238E27FC236}">
-                <a16:creationId xmlns:a16="http://schemas.microsoft.com/office/drawing/2014/main" id="{320620FF-266D-439D-828E-695F59B5BBED}"/>
-              </a:ext>
-            </a:extLst>
-          </p:cNvPr>
-          <p:cNvPicPr>
-            <a:picLocks noChangeAspect="1"/>
-          </p:cNvPicPr>
-          <p:nvPr/>
-        </p:nvPicPr>
-        <p:blipFill>
-          <a:blip r:embed="rId2">
-            <a:clrChange>
-              <a:clrFrom>
-                <a:srgbClr val="FFFFFF"/>
-              </a:clrFrom>
-              <a:clrTo>
-                <a:srgbClr val="FFFFFF">
-                  <a:alpha val="0"/>
-                </a:srgbClr>
-              </a:clrTo>
-            </a:clrChange>
-            <a:extLst>
-              <a:ext uri="{28A0092B-C50C-407E-A947-70E740481C1C}">
-                <a14:useLocalDpi xmlns:a14="http://schemas.microsoft.com/office/drawing/2010/main" val="0"/>
-              </a:ext>
-            </a:extLst>
-          </a:blip>
-          <a:stretch>
-            <a:fillRect/>
-          </a:stretch>
-        </p:blipFill>
-        <p:spPr>
-          <a:xfrm>
-            <a:off x="1283829" y="-15983858"/>
-            <a:ext cx="52741971" cy="25789978"/>
-          </a:xfrm>
-          <a:prstGeom prst="rect">
-            <a:avLst/>
-          </a:prstGeom>
-        </p:spPr>
-      </p:pic>
-    </p:spTree>
-    <p:extLst>
-      <p:ext uri="{BB962C8B-B14F-4D97-AF65-F5344CB8AC3E}">
-        <p14:creationId xmlns:p14="http://schemas.microsoft.com/office/powerpoint/2010/main" val="2634899650"/>
-      </p:ext>
-    </p:extLst>
-  </p:cSld>
-  <p:clrMapOvr>
-    <a:masterClrMapping/>
-  </p:clrMapOvr>
-  <mc:AlternateContent xmlns:mc="http://schemas.openxmlformats.org/markup-compatibility/2006">
-    <mc:Choice xmlns:p159="http://schemas.microsoft.com/office/powerpoint/2015/09/main" Requires="p159">
-      <p:transition xmlns:p14="http://schemas.microsoft.com/office/powerpoint/2010/main" spd="slow" p14:dur="2000">
-        <p159:morph option="byObject"/>
-      </p:transition>
-    </mc:Choice>
-    <mc:Fallback>
-      <p:transition spd="slow">
-        <p:fade/>
-      </p:transition>
-    </mc:Fallback>
-  </mc:AlternateContent>
-</p:sld>
-</file>
-
-<file path=ppt/slides/slide4.xml><?xml version="1.0" encoding="utf-8"?>
-<p:sld xmlns:a="http://schemas.openxmlformats.org/drawingml/2006/main" xmlns:r="http://schemas.openxmlformats.org/officeDocument/2006/relationships" xmlns:p="http://schemas.openxmlformats.org/presentationml/2006/main">
-  <p:cSld>
-    <p:spTree>
-      <p:nvGrpSpPr>
-        <p:cNvPr id="1" name=""/>
-        <p:cNvGrpSpPr/>
-        <p:nvPr/>
-      </p:nvGrpSpPr>
-      <p:grpSpPr>
-        <a:xfrm>
-          <a:off x="0" y="0"/>
-          <a:ext cx="0" cy="0"/>
-          <a:chOff x="0" y="0"/>
-          <a:chExt cx="0" cy="0"/>
-        </a:xfrm>
-      </p:grpSpPr>
-      <p:pic>
-        <p:nvPicPr>
-          <p:cNvPr id="3" name="Grafik 2" descr="Ein Bild, das Screenshot, Karte enthält.&#10;&#10;Mit sehr hoher Zuverlässigkeit generierte Beschreibung">
-            <a:extLst>
-              <a:ext uri="{FF2B5EF4-FFF2-40B4-BE49-F238E27FC236}">
-                <a16:creationId xmlns:a16="http://schemas.microsoft.com/office/drawing/2014/main" id="{320620FF-266D-439D-828E-695F59B5BBED}"/>
-              </a:ext>
-            </a:extLst>
-          </p:cNvPr>
-          <p:cNvPicPr>
-            <a:picLocks noChangeAspect="1"/>
-          </p:cNvPicPr>
-          <p:nvPr/>
-        </p:nvPicPr>
-        <p:blipFill>
-          <a:blip r:embed="rId2">
-            <a:clrChange>
-              <a:clrFrom>
-                <a:srgbClr val="FFFFFF"/>
-              </a:clrFrom>
-              <a:clrTo>
-                <a:srgbClr val="FFFFFF">
-                  <a:alpha val="0"/>
-                </a:srgbClr>
-              </a:clrTo>
-            </a:clrChange>
-            <a:extLst>
-              <a:ext uri="{28A0092B-C50C-407E-A947-70E740481C1C}">
-                <a14:useLocalDpi xmlns:a14="http://schemas.microsoft.com/office/drawing/2010/main" val="0"/>
-              </a:ext>
-            </a:extLst>
-          </a:blip>
-          <a:stretch>
-            <a:fillRect/>
-          </a:stretch>
-        </p:blipFill>
-        <p:spPr>
-          <a:xfrm>
-            <a:off x="-1459370" y="-11335658"/>
-            <a:ext cx="32532064" cy="15907658"/>
-          </a:xfrm>
-          <a:prstGeom prst="rect">
-            <a:avLst/>
-          </a:prstGeom>
-        </p:spPr>
-      </p:pic>
-    </p:spTree>
-    <p:extLst>
-      <p:ext uri="{BB962C8B-B14F-4D97-AF65-F5344CB8AC3E}">
-        <p14:creationId xmlns:p14="http://schemas.microsoft.com/office/powerpoint/2010/main" val="1998676628"/>
-      </p:ext>
-    </p:extLst>
-  </p:cSld>
-  <p:clrMapOvr>
-    <a:masterClrMapping/>
-  </p:clrMapOvr>
-  <mc:AlternateContent xmlns:mc="http://schemas.openxmlformats.org/markup-compatibility/2006">
-    <mc:Choice xmlns:p159="http://schemas.microsoft.com/office/powerpoint/2015/09/main" Requires="p159">
-      <p:transition xmlns:p14="http://schemas.microsoft.com/office/powerpoint/2010/main" spd="slow" p14:dur="2000">
-        <p159:morph option="byObject"/>
-      </p:transition>
-    </mc:Choice>
-    <mc:Fallback>
-      <p:transition spd="slow">
-        <p:fade/>
-      </p:transition>
-    </mc:Fallback>
-  </mc:AlternateContent>
-</p:sld>
-</file>
-
-<file path=ppt/slides/slide5.xml><?xml version="1.0" encoding="utf-8"?>
-<p:sld xmlns:a="http://schemas.openxmlformats.org/drawingml/2006/main" xmlns:r="http://schemas.openxmlformats.org/officeDocument/2006/relationships" xmlns:p="http://schemas.openxmlformats.org/presentationml/2006/main">
-  <p:cSld>
-    <p:spTree>
-      <p:nvGrpSpPr>
-        <p:cNvPr id="1" name=""/>
-        <p:cNvGrpSpPr/>
-        <p:nvPr/>
-      </p:nvGrpSpPr>
-      <p:grpSpPr>
-        <a:xfrm>
-          <a:off x="0" y="0"/>
-          <a:ext cx="0" cy="0"/>
-          <a:chOff x="0" y="0"/>
-          <a:chExt cx="0" cy="0"/>
-        </a:xfrm>
-      </p:grpSpPr>
-      <p:pic>
-        <p:nvPicPr>
-          <p:cNvPr id="3" name="Grafik 2" descr="Ein Bild, das Screenshot, Karte enthält.&#10;&#10;Mit sehr hoher Zuverlässigkeit generierte Beschreibung">
-            <a:extLst>
-              <a:ext uri="{FF2B5EF4-FFF2-40B4-BE49-F238E27FC236}">
-                <a16:creationId xmlns:a16="http://schemas.microsoft.com/office/drawing/2014/main" id="{320620FF-266D-439D-828E-695F59B5BBED}"/>
-              </a:ext>
-            </a:extLst>
-          </p:cNvPr>
-          <p:cNvPicPr>
-            <a:picLocks noChangeAspect="1"/>
-          </p:cNvPicPr>
-          <p:nvPr/>
-        </p:nvPicPr>
-        <p:blipFill>
-          <a:blip r:embed="rId2">
-            <a:clrChange>
-              <a:clrFrom>
-                <a:srgbClr val="FFFFFF"/>
-              </a:clrFrom>
-              <a:clrTo>
-                <a:srgbClr val="FFFFFF">
-                  <a:alpha val="0"/>
-                </a:srgbClr>
-              </a:clrTo>
-            </a:clrChange>
-            <a:extLst>
-              <a:ext uri="{28A0092B-C50C-407E-A947-70E740481C1C}">
-                <a14:useLocalDpi xmlns:a14="http://schemas.microsoft.com/office/drawing/2010/main" val="0"/>
-              </a:ext>
-            </a:extLst>
-          </a:blip>
-          <a:stretch>
-            <a:fillRect/>
-          </a:stretch>
-        </p:blipFill>
-        <p:spPr>
-          <a:xfrm>
-            <a:off x="712329" y="627742"/>
-            <a:ext cx="10767341" cy="5265057"/>
-          </a:xfrm>
-          <a:prstGeom prst="rect">
-            <a:avLst/>
-          </a:prstGeom>
-        </p:spPr>
-      </p:pic>
-    </p:spTree>
-    <p:extLst>
-      <p:ext uri="{BB962C8B-B14F-4D97-AF65-F5344CB8AC3E}">
-        <p14:creationId xmlns:p14="http://schemas.microsoft.com/office/powerpoint/2010/main" val="116990788"/>
-      </p:ext>
-    </p:extLst>
-  </p:cSld>
-  <p:clrMapOvr>
-    <a:masterClrMapping/>
-  </p:clrMapOvr>
-  <mc:AlternateContent xmlns:mc="http://schemas.openxmlformats.org/markup-compatibility/2006">
-    <mc:Choice xmlns:p159="http://schemas.microsoft.com/office/powerpoint/2015/09/main" Requires="p159">
-      <p:transition xmlns:p14="http://schemas.microsoft.com/office/powerpoint/2010/main" spd="slow" p14:dur="2000">
-        <p159:morph option="byObject"/>
-      </p:transition>
-    </mc:Choice>
-    <mc:Fallback>
-      <p:transition spd="slow">
-        <p:fade/>
-      </p:transition>
-    </mc:Fallback>
-  </mc:AlternateContent>
-</p:sld>
-</file>
-
-<file path=ppt/slides/slide6.xml><?xml version="1.0" encoding="utf-8"?>
-<p:sld xmlns:a="http://schemas.openxmlformats.org/drawingml/2006/main" xmlns:r="http://schemas.openxmlformats.org/officeDocument/2006/relationships" xmlns:p="http://schemas.openxmlformats.org/presentationml/2006/main">
-  <p:cSld>
-    <p:spTree>
-      <p:nvGrpSpPr>
-        <p:cNvPr id="1" name=""/>
-        <p:cNvGrpSpPr/>
-        <p:nvPr/>
-      </p:nvGrpSpPr>
-      <p:grpSpPr>
-        <a:xfrm>
-          <a:off x="0" y="0"/>
-          <a:ext cx="0" cy="0"/>
-          <a:chOff x="0" y="0"/>
-          <a:chExt cx="0" cy="0"/>
-        </a:xfrm>
-      </p:grpSpPr>
-      <p:pic>
-        <p:nvPicPr>
-          <p:cNvPr id="3" name="Grafik 2" descr="Ein Bild, das Screenshot, Karte enthält.&#10;&#10;Mit sehr hoher Zuverlässigkeit generierte Beschreibung">
-            <a:extLst>
-              <a:ext uri="{FF2B5EF4-FFF2-40B4-BE49-F238E27FC236}">
-                <a16:creationId xmlns:a16="http://schemas.microsoft.com/office/drawing/2014/main" id="{320620FF-266D-439D-828E-695F59B5BBED}"/>
-              </a:ext>
-            </a:extLst>
-          </p:cNvPr>
-          <p:cNvPicPr>
-            <a:picLocks noChangeAspect="1"/>
-          </p:cNvPicPr>
-          <p:nvPr/>
-        </p:nvPicPr>
-        <p:blipFill>
-          <a:blip r:embed="rId2">
-            <a:clrChange>
-              <a:clrFrom>
-                <a:srgbClr val="FFFFFF"/>
-              </a:clrFrom>
-              <a:clrTo>
-                <a:srgbClr val="FFFFFF">
-                  <a:alpha val="0"/>
-                </a:srgbClr>
-              </a:clrTo>
-            </a:clrChange>
-            <a:extLst>
-              <a:ext uri="{28A0092B-C50C-407E-A947-70E740481C1C}">
-                <a14:useLocalDpi xmlns:a14="http://schemas.microsoft.com/office/drawing/2010/main" val="0"/>
-              </a:ext>
-            </a:extLst>
-          </a:blip>
-          <a:stretch>
-            <a:fillRect/>
-          </a:stretch>
-        </p:blipFill>
-        <p:spPr>
-          <a:xfrm>
-            <a:off x="-9803271" y="762000"/>
-            <a:ext cx="38263971" cy="18710467"/>
-          </a:xfrm>
-          <a:prstGeom prst="rect">
-            <a:avLst/>
-          </a:prstGeom>
-        </p:spPr>
-      </p:pic>
-    </p:spTree>
-    <p:extLst>
-      <p:ext uri="{BB962C8B-B14F-4D97-AF65-F5344CB8AC3E}">
-        <p14:creationId xmlns:p14="http://schemas.microsoft.com/office/powerpoint/2010/main" val="3557378232"/>
-      </p:ext>
-    </p:extLst>
-  </p:cSld>
-  <p:clrMapOvr>
-    <a:masterClrMapping/>
-  </p:clrMapOvr>
-  <mc:AlternateContent xmlns:mc="http://schemas.openxmlformats.org/markup-compatibility/2006">
-    <mc:Choice xmlns:p159="http://schemas.microsoft.com/office/powerpoint/2015/09/main" Requires="p159">
-      <p:transition xmlns:p14="http://schemas.microsoft.com/office/powerpoint/2010/main" spd="slow" p14:dur="2000">
-        <p159:morph option="byObject"/>
-      </p:transition>
-    </mc:Choice>
-    <mc:Fallback>
-      <p:transition spd="slow">
-        <p:fade/>
-      </p:transition>
-    </mc:Fallback>
-  </mc:AlternateContent>
-</p:sld>
-</file>
-
-<file path=ppt/slides/slide7.xml><?xml version="1.0" encoding="utf-8"?>
-<p:sld xmlns:a="http://schemas.openxmlformats.org/drawingml/2006/main" xmlns:r="http://schemas.openxmlformats.org/officeDocument/2006/relationships" xmlns:p="http://schemas.openxmlformats.org/presentationml/2006/main">
-  <p:cSld>
-    <p:spTree>
-      <p:nvGrpSpPr>
-        <p:cNvPr id="1" name=""/>
-        <p:cNvGrpSpPr/>
-        <p:nvPr/>
-      </p:nvGrpSpPr>
-      <p:grpSpPr>
-        <a:xfrm>
-          <a:off x="0" y="0"/>
-          <a:ext cx="0" cy="0"/>
-          <a:chOff x="0" y="0"/>
-          <a:chExt cx="0" cy="0"/>
-        </a:xfrm>
-      </p:grpSpPr>
-      <p:pic>
-        <p:nvPicPr>
-          <p:cNvPr id="3" name="Grafik 2" descr="Ein Bild, das Screenshot, Karte enthält.&#10;&#10;Mit sehr hoher Zuverlässigkeit generierte Beschreibung">
-            <a:extLst>
-              <a:ext uri="{FF2B5EF4-FFF2-40B4-BE49-F238E27FC236}">
-                <a16:creationId xmlns:a16="http://schemas.microsoft.com/office/drawing/2014/main" id="{320620FF-266D-439D-828E-695F59B5BBED}"/>
-              </a:ext>
-            </a:extLst>
-          </p:cNvPr>
-          <p:cNvPicPr>
-            <a:picLocks noChangeAspect="1"/>
-          </p:cNvPicPr>
-          <p:nvPr/>
-        </p:nvPicPr>
-        <p:blipFill>
-          <a:blip r:embed="rId2">
-            <a:clrChange>
-              <a:clrFrom>
-                <a:srgbClr val="FFFFFF"/>
-              </a:clrFrom>
-              <a:clrTo>
-                <a:srgbClr val="FFFFFF">
-                  <a:alpha val="0"/>
-                </a:srgbClr>
-              </a:clrTo>
-            </a:clrChange>
-            <a:extLst>
-              <a:ext uri="{28A0092B-C50C-407E-A947-70E740481C1C}">
-                <a14:useLocalDpi xmlns:a14="http://schemas.microsoft.com/office/drawing/2010/main" val="0"/>
-              </a:ext>
-            </a:extLst>
-          </a:blip>
-          <a:stretch>
-            <a:fillRect/>
-          </a:stretch>
-        </p:blipFill>
-        <p:spPr>
-          <a:xfrm>
-            <a:off x="-15403971" y="-4287158"/>
-            <a:ext cx="52741971" cy="25789978"/>
-          </a:xfrm>
-          <a:prstGeom prst="rect">
-            <a:avLst/>
-          </a:prstGeom>
-        </p:spPr>
-      </p:pic>
-    </p:spTree>
-    <p:extLst>
-      <p:ext uri="{BB962C8B-B14F-4D97-AF65-F5344CB8AC3E}">
-        <p14:creationId xmlns:p14="http://schemas.microsoft.com/office/powerpoint/2010/main" val="2544849109"/>
-      </p:ext>
-    </p:extLst>
-  </p:cSld>
-  <p:clrMapOvr>
-    <a:masterClrMapping/>
-  </p:clrMapOvr>
-  <mc:AlternateContent xmlns:mc="http://schemas.openxmlformats.org/markup-compatibility/2006">
-    <mc:Choice xmlns:p159="http://schemas.microsoft.com/office/powerpoint/2015/09/main" Requires="p159">
-      <p:transition xmlns:p14="http://schemas.microsoft.com/office/powerpoint/2010/main" spd="slow" p14:dur="2000">
-        <p159:morph option="byObject"/>
-      </p:transition>
-    </mc:Choice>
-    <mc:Fallback>
-      <p:transition spd="slow">
-        <p:fade/>
-      </p:transition>
-    </mc:Fallback>
-  </mc:AlternateContent>
-</p:sld>
-</file>
-
-<file path=ppt/slides/slide8.xml><?xml version="1.0" encoding="utf-8"?>
-<p:sld xmlns:a="http://schemas.openxmlformats.org/drawingml/2006/main" xmlns:r="http://schemas.openxmlformats.org/officeDocument/2006/relationships" xmlns:p="http://schemas.openxmlformats.org/presentationml/2006/main">
-  <p:cSld>
-    <p:spTree>
-      <p:nvGrpSpPr>
-        <p:cNvPr id="1" name=""/>
-        <p:cNvGrpSpPr/>
-        <p:nvPr/>
-      </p:nvGrpSpPr>
-      <p:grpSpPr>
-        <a:xfrm>
-          <a:off x="0" y="0"/>
-          <a:ext cx="0" cy="0"/>
-          <a:chOff x="0" y="0"/>
-          <a:chExt cx="0" cy="0"/>
-        </a:xfrm>
-      </p:grpSpPr>
-      <p:pic>
-        <p:nvPicPr>
-          <p:cNvPr id="3" name="Grafik 2" descr="Ein Bild, das Screenshot, Karte enthält.&#10;&#10;Mit sehr hoher Zuverlässigkeit generierte Beschreibung">
-            <a:extLst>
-              <a:ext uri="{FF2B5EF4-FFF2-40B4-BE49-F238E27FC236}">
-                <a16:creationId xmlns:a16="http://schemas.microsoft.com/office/drawing/2014/main" id="{320620FF-266D-439D-828E-695F59B5BBED}"/>
-              </a:ext>
-            </a:extLst>
-          </p:cNvPr>
-          <p:cNvPicPr>
-            <a:picLocks noChangeAspect="1"/>
-          </p:cNvPicPr>
-          <p:nvPr/>
-        </p:nvPicPr>
-        <p:blipFill>
-          <a:blip r:embed="rId2">
-            <a:clrChange>
-              <a:clrFrom>
-                <a:srgbClr val="FFFFFF"/>
-              </a:clrFrom>
-              <a:clrTo>
-                <a:srgbClr val="FFFFFF">
-                  <a:alpha val="0"/>
-                </a:srgbClr>
-              </a:clrTo>
-            </a:clrChange>
-            <a:extLst>
-              <a:ext uri="{28A0092B-C50C-407E-A947-70E740481C1C}">
-                <a14:useLocalDpi xmlns:a14="http://schemas.microsoft.com/office/drawing/2010/main" val="0"/>
-              </a:ext>
-            </a:extLst>
-          </a:blip>
-          <a:stretch>
-            <a:fillRect/>
-          </a:stretch>
-        </p:blipFill>
-        <p:spPr>
-          <a:xfrm>
-            <a:off x="-19594971" y="-5696858"/>
-            <a:ext cx="52741971" cy="25789978"/>
-          </a:xfrm>
-          <a:prstGeom prst="rect">
-            <a:avLst/>
-          </a:prstGeom>
-        </p:spPr>
-      </p:pic>
-    </p:spTree>
-    <p:extLst>
-      <p:ext uri="{BB962C8B-B14F-4D97-AF65-F5344CB8AC3E}">
-        <p14:creationId xmlns:p14="http://schemas.microsoft.com/office/powerpoint/2010/main" val="2414750448"/>
-      </p:ext>
-    </p:extLst>
-  </p:cSld>
-  <p:clrMapOvr>
-    <a:masterClrMapping/>
-  </p:clrMapOvr>
-  <mc:AlternateContent xmlns:mc="http://schemas.openxmlformats.org/markup-compatibility/2006">
-    <mc:Choice xmlns:p159="http://schemas.microsoft.com/office/powerpoint/2015/09/main" Requires="p159">
-      <p:transition xmlns:p14="http://schemas.microsoft.com/office/powerpoint/2010/main" spd="slow" p14:dur="2000">
-        <p159:morph option="byObject"/>
-      </p:transition>
-    </mc:Choice>
-    <mc:Fallback>
-      <p:transition spd="slow">
-        <p:fade/>
-      </p:transition>
-    </mc:Fallback>
-  </mc:AlternateContent>
-</p:sld>
-</file>
-
-<file path=ppt/slides/slide9.xml><?xml version="1.0" encoding="utf-8"?>
-<p:sld xmlns:a="http://schemas.openxmlformats.org/drawingml/2006/main" xmlns:r="http://schemas.openxmlformats.org/officeDocument/2006/relationships" xmlns:p="http://schemas.openxmlformats.org/presentationml/2006/main">
-  <p:cSld>
-    <p:spTree>
-      <p:nvGrpSpPr>
-        <p:cNvPr id="1" name=""/>
-        <p:cNvGrpSpPr/>
-        <p:nvPr/>
-      </p:nvGrpSpPr>
-      <p:grpSpPr>
-        <a:xfrm>
-          <a:off x="0" y="0"/>
-          <a:ext cx="0" cy="0"/>
-          <a:chOff x="0" y="0"/>
-          <a:chExt cx="0" cy="0"/>
-        </a:xfrm>
-      </p:grpSpPr>
-      <p:pic>
-        <p:nvPicPr>
-          <p:cNvPr id="3" name="Grafik 2" descr="Ein Bild, das Screenshot, Karte enthält.&#10;&#10;Mit sehr hoher Zuverlässigkeit generierte Beschreibung">
-            <a:extLst>
-              <a:ext uri="{FF2B5EF4-FFF2-40B4-BE49-F238E27FC236}">
-                <a16:creationId xmlns:a16="http://schemas.microsoft.com/office/drawing/2014/main" id="{320620FF-266D-439D-828E-695F59B5BBED}"/>
-              </a:ext>
-            </a:extLst>
-          </p:cNvPr>
-          <p:cNvPicPr>
-            <a:picLocks noChangeAspect="1"/>
-          </p:cNvPicPr>
-          <p:nvPr/>
-        </p:nvPicPr>
-        <p:blipFill>
-          <a:blip r:embed="rId2">
-            <a:clrChange>
-              <a:clrFrom>
-                <a:srgbClr val="FFFFFF"/>
-              </a:clrFrom>
-              <a:clrTo>
-                <a:srgbClr val="FFFFFF">
-                  <a:alpha val="0"/>
-                </a:srgbClr>
-              </a:clrTo>
-            </a:clrChange>
-            <a:extLst>
-              <a:ext uri="{28A0092B-C50C-407E-A947-70E740481C1C}">
-                <a14:useLocalDpi xmlns:a14="http://schemas.microsoft.com/office/drawing/2010/main" val="0"/>
-              </a:ext>
-            </a:extLst>
-          </a:blip>
-          <a:stretch>
-            <a:fillRect/>
-          </a:stretch>
-        </p:blipFill>
-        <p:spPr>
-          <a:xfrm>
-            <a:off x="-19480671" y="-8935358"/>
-            <a:ext cx="47141271" cy="23051325"/>
-          </a:xfrm>
-          <a:prstGeom prst="rect">
-            <a:avLst/>
-          </a:prstGeom>
-        </p:spPr>
-      </p:pic>
-    </p:spTree>
-    <p:extLst>
-      <p:ext uri="{BB962C8B-B14F-4D97-AF65-F5344CB8AC3E}">
-        <p14:creationId xmlns:p14="http://schemas.microsoft.com/office/powerpoint/2010/main" val="3310597157"/>
-      </p:ext>
-    </p:extLst>
-  </p:cSld>
-  <p:clrMapOvr>
-    <a:masterClrMapping/>
-  </p:clrMapOvr>
-  <mc:AlternateContent xmlns:mc="http://schemas.openxmlformats.org/markup-compatibility/2006">
-    <mc:Choice xmlns:p159="http://schemas.microsoft.com/office/powerpoint/2015/09/main" Requires="p159">
-      <p:transition xmlns:p14="http://schemas.microsoft.com/office/powerpoint/2010/main" spd="slow" p14:dur="2000">
-        <p159:morph option="byObject"/>
-      </p:transition>
-    </mc:Choice>
-    <mc:Fallback>
+    <mc:Fallback xmlns="">
       <p:transition spd="slow">
         <p:fade/>
       </p:transition>

</xml_diff>